<commit_message>
added pdf version of class assignment, fixed some errors
</commit_message>
<xml_diff>
--- a/02_introduction_to_python_part_ii/slides.pptx
+++ b/02_introduction_to_python_part_ii/slides.pptx
@@ -5816,12 +5816,16 @@
           </a:p>
           <a:p>
             <a:r>
-              <a:rPr lang="en-US" sz="1400" dirty="0">
-                <a:latin typeface="Courier New" panose="02070309020205020404" pitchFamily="49" charset="0"/>
-                <a:cs typeface="Courier New" panose="02070309020205020404" pitchFamily="49" charset="0"/>
-              </a:rPr>
-              <a:t>'value’</a:t>
-            </a:r>
+              <a:rPr lang="en-US" sz="1400">
+                <a:latin typeface="Courier New" panose="02070309020205020404" pitchFamily="49" charset="0"/>
+                <a:cs typeface="Courier New" panose="02070309020205020404" pitchFamily="49" charset="0"/>
+              </a:rPr>
+              <a:t>'value1’</a:t>
+            </a:r>
+            <a:endParaRPr lang="en-US" sz="1400" dirty="0">
+              <a:latin typeface="Courier New" panose="02070309020205020404" pitchFamily="49" charset="0"/>
+              <a:cs typeface="Courier New" panose="02070309020205020404" pitchFamily="49" charset="0"/>
+            </a:endParaRPr>
           </a:p>
           <a:p>
             <a:endParaRPr lang="en-US" sz="1400" dirty="0">

</xml_diff>